<commit_message>
pertemuan 6 dan 7
</commit_message>
<xml_diff>
--- a/semester 3/Graph Terapan/pertemuan 6/GRAPH TERAPAN - Kelompok 8 - Modul 3.pptx
+++ b/semester 3/Graph Terapan/pertemuan 6/GRAPH TERAPAN - Kelompok 8 - Modul 3.pptx
@@ -12,11 +12,13 @@
     <p:sldId id="272" r:id="rId9"/>
     <p:sldId id="273" r:id="rId10"/>
     <p:sldId id="274" r:id="rId11"/>
-    <p:sldId id="275" r:id="rId12"/>
-    <p:sldId id="276" r:id="rId13"/>
-    <p:sldId id="277" r:id="rId14"/>
-    <p:sldId id="278" r:id="rId15"/>
-    <p:sldId id="279" r:id="rId16"/>
+    <p:sldId id="280" r:id="rId12"/>
+    <p:sldId id="281" r:id="rId13"/>
+    <p:sldId id="275" r:id="rId14"/>
+    <p:sldId id="276" r:id="rId15"/>
+    <p:sldId id="277" r:id="rId16"/>
+    <p:sldId id="278" r:id="rId17"/>
+    <p:sldId id="279" r:id="rId18"/>
   </p:sldIdLst>
   <p:sldSz cx="12192000" cy="6858000"/>
   <p:notesSz cx="6858000" cy="9144000"/>
@@ -367,7 +369,7 @@
           <a:p>
             <a:fld id="{9184DA70-C731-4C70-880D-CCD4705E623C}" type="datetime1">
               <a:rPr lang="en-US" smtClean="0"/>
-              <a:t>10/12/2021</a:t>
+              <a:t>10/13/2021</a:t>
             </a:fld>
             <a:endParaRPr lang="en-US" dirty="0"/>
           </a:p>
@@ -555,7 +557,7 @@
           <a:p>
             <a:fld id="{4BE1D723-8F53-4F53-90B0-1982A396982E}" type="datetime1">
               <a:rPr lang="en-US" smtClean="0"/>
-              <a:t>10/12/2021</a:t>
+              <a:t>10/13/2021</a:t>
             </a:fld>
             <a:endParaRPr lang="en-US" dirty="0"/>
           </a:p>
@@ -928,7 +930,7 @@
           <a:p>
             <a:fld id="{97669AF7-7BEB-44E4-9852-375E34362B5B}" type="datetime1">
               <a:rPr lang="en-US" smtClean="0"/>
-              <a:t>10/12/2021</a:t>
+              <a:t>10/13/2021</a:t>
             </a:fld>
             <a:endParaRPr lang="en-US" dirty="0"/>
           </a:p>
@@ -1183,7 +1185,7 @@
           <a:p>
             <a:fld id="{BAAAC38D-0552-4C82-B593-E6124DFADBE2}" type="datetime1">
               <a:rPr lang="en-US" smtClean="0"/>
-              <a:t>10/12/2021</a:t>
+              <a:t>10/13/2021</a:t>
             </a:fld>
             <a:endParaRPr lang="en-US" dirty="0"/>
           </a:p>
@@ -1580,7 +1582,7 @@
           <a:p>
             <a:fld id="{D9DF0F1C-5577-4ACB-BB62-DF8F3C494C7E}" type="datetime1">
               <a:rPr lang="en-US" smtClean="0"/>
-              <a:t>10/12/2021</a:t>
+              <a:t>10/13/2021</a:t>
             </a:fld>
             <a:endParaRPr lang="en-US" dirty="0"/>
           </a:p>
@@ -1716,7 +1718,7 @@
           <a:p>
             <a:fld id="{1775B394-D9F9-4F0C-B15D-605F45CB9E9F}" type="datetime1">
               <a:rPr lang="en-US" smtClean="0"/>
-              <a:t>10/12/2021</a:t>
+              <a:t>10/13/2021</a:t>
             </a:fld>
             <a:endParaRPr lang="en-US" dirty="0"/>
           </a:p>
@@ -1873,7 +1875,7 @@
           <a:p>
             <a:fld id="{39667345-2558-425A-8533-9BFDBCE15005}" type="datetime1">
               <a:rPr lang="en-US" smtClean="0"/>
-              <a:t>10/12/2021</a:t>
+              <a:t>10/13/2021</a:t>
             </a:fld>
             <a:endParaRPr lang="en-US" dirty="0"/>
           </a:p>
@@ -2202,7 +2204,7 @@
           <a:p>
             <a:fld id="{92BEA474-078D-4E9B-9B14-09A87B19DC46}" type="datetime1">
               <a:rPr lang="en-US" smtClean="0"/>
-              <a:t>10/12/2021</a:t>
+              <a:t>10/13/2021</a:t>
             </a:fld>
             <a:endParaRPr lang="en-US" dirty="0"/>
           </a:p>
@@ -2552,7 +2554,7 @@
           <a:p>
             <a:fld id="{4907D986-8816-4272-A432-0437A28A9828}" type="datetime1">
               <a:rPr lang="en-US" smtClean="0"/>
-              <a:t>10/12/2021</a:t>
+              <a:t>10/13/2021</a:t>
             </a:fld>
             <a:endParaRPr lang="en-US" dirty="0"/>
           </a:p>
@@ -2813,7 +2815,7 @@
           <a:p>
             <a:fld id="{62D6E202-B606-4609-B914-27C9371A1F6D}" type="datetime1">
               <a:rPr lang="en-US" smtClean="0"/>
-              <a:t>10/12/2021</a:t>
+              <a:t>10/13/2021</a:t>
             </a:fld>
             <a:endParaRPr lang="en-US" dirty="0"/>
           </a:p>
@@ -3570,8 +3572,27 @@
                   </a:schemeClr>
                 </a:solidFill>
               </a:rPr>
-              <a:t> Saputra</a:t>
-            </a:r>
+              <a:t> Saputra 	</a:t>
+            </a:r>
+            <a:r>
+              <a:rPr lang="en-US" sz="2000">
+                <a:solidFill>
+                  <a:schemeClr val="tx1">
+                    <a:lumMod val="85000"/>
+                    <a:lumOff val="15000"/>
+                  </a:schemeClr>
+                </a:solidFill>
+              </a:rPr>
+              <a:t>- 201011402125</a:t>
+            </a:r>
+            <a:endParaRPr lang="en-US" sz="2000" dirty="0">
+              <a:solidFill>
+                <a:schemeClr val="tx1">
+                  <a:lumMod val="85000"/>
+                  <a:lumOff val="15000"/>
+                </a:schemeClr>
+              </a:solidFill>
+            </a:endParaRPr>
           </a:p>
           <a:p>
             <a:pPr>
@@ -3599,7 +3620,29 @@
                   </a:schemeClr>
                 </a:solidFill>
               </a:rPr>
-              <a:t> Ramadhan</a:t>
+              <a:t> </a:t>
+            </a:r>
+            <a:r>
+              <a:rPr lang="en-US" sz="2000" dirty="0" err="1">
+                <a:solidFill>
+                  <a:schemeClr val="tx1">
+                    <a:lumMod val="85000"/>
+                    <a:lumOff val="15000"/>
+                  </a:schemeClr>
+                </a:solidFill>
+              </a:rPr>
+              <a:t>RamadhaN</a:t>
+            </a:r>
+            <a:r>
+              <a:rPr lang="en-US" sz="2000" dirty="0">
+                <a:solidFill>
+                  <a:schemeClr val="tx1">
+                    <a:lumMod val="85000"/>
+                    <a:lumOff val="15000"/>
+                  </a:schemeClr>
+                </a:solidFill>
+              </a:rPr>
+              <a:t>		- 201011400699</a:t>
             </a:r>
           </a:p>
           <a:p>
@@ -3652,14 +3695,17 @@
               </a:rPr>
               <a:t>ariski</a:t>
             </a:r>
-            <a:endParaRPr lang="en-US" sz="2000" dirty="0">
-              <a:solidFill>
-                <a:schemeClr val="tx1">
-                  <a:lumMod val="85000"/>
-                  <a:lumOff val="15000"/>
-                </a:schemeClr>
-              </a:solidFill>
-            </a:endParaRPr>
+            <a:r>
+              <a:rPr lang="en-US" sz="2000" dirty="0">
+                <a:solidFill>
+                  <a:schemeClr val="tx1">
+                    <a:lumMod val="85000"/>
+                    <a:lumOff val="15000"/>
+                  </a:schemeClr>
+                </a:solidFill>
+              </a:rPr>
+              <a:t> 	- 201011401871 </a:t>
+            </a:r>
           </a:p>
           <a:p>
             <a:pPr>
@@ -3829,6 +3875,883 @@
           <a:p>
             <a:r>
               <a:rPr lang="en-ID" dirty="0"/>
+              <a:t>6. </a:t>
+            </a:r>
+            <a:r>
+              <a:rPr lang="en-ID" dirty="0" err="1"/>
+              <a:t>Lintasan</a:t>
+            </a:r>
+            <a:r>
+              <a:rPr lang="en-ID" dirty="0"/>
+              <a:t> (Path)</a:t>
+            </a:r>
+          </a:p>
+        </p:txBody>
+      </p:sp>
+      <p:sp>
+        <p:nvSpPr>
+          <p:cNvPr id="3" name="Content Placeholder 2">
+            <a:extLst>
+              <a:ext uri="{FF2B5EF4-FFF2-40B4-BE49-F238E27FC236}">
+                <a16:creationId xmlns:a16="http://schemas.microsoft.com/office/drawing/2014/main" id="{6ED8502D-F1EC-4778-A077-A34A0736E5F9}"/>
+              </a:ext>
+            </a:extLst>
+          </p:cNvPr>
+          <p:cNvSpPr>
+            <a:spLocks noGrp="1"/>
+          </p:cNvSpPr>
+          <p:nvPr>
+            <p:ph idx="1"/>
+          </p:nvPr>
+        </p:nvSpPr>
+        <p:spPr>
+          <a:xfrm>
+            <a:off x="4114800" y="1868748"/>
+            <a:ext cx="7040880" cy="4322926"/>
+          </a:xfrm>
+        </p:spPr>
+        <p:txBody>
+          <a:bodyPr>
+            <a:noAutofit/>
+          </a:bodyPr>
+          <a:lstStyle/>
+          <a:p>
+            <a:pPr marL="0" indent="0">
+              <a:lnSpc>
+                <a:spcPct val="150000"/>
+              </a:lnSpc>
+              <a:buNone/>
+            </a:pPr>
+            <a:r>
+              <a:rPr lang="en-ID" dirty="0" err="1"/>
+              <a:t>Lintasan</a:t>
+            </a:r>
+            <a:r>
+              <a:rPr lang="en-ID" dirty="0"/>
+              <a:t> yang </a:t>
+            </a:r>
+            <a:r>
+              <a:rPr lang="en-ID" dirty="0" err="1"/>
+              <a:t>panjangnya</a:t>
+            </a:r>
+            <a:r>
+              <a:rPr lang="en-ID" dirty="0"/>
+              <a:t> n </a:t>
+            </a:r>
+            <a:r>
+              <a:rPr lang="en-ID" dirty="0" err="1"/>
+              <a:t>dari</a:t>
+            </a:r>
+            <a:r>
+              <a:rPr lang="en-ID" dirty="0"/>
+              <a:t> </a:t>
+            </a:r>
+            <a:r>
+              <a:rPr lang="en-ID" dirty="0" err="1"/>
+              <a:t>simpul</a:t>
+            </a:r>
+            <a:r>
+              <a:rPr lang="en-ID" dirty="0"/>
+              <a:t> </a:t>
+            </a:r>
+            <a:r>
+              <a:rPr lang="en-ID" dirty="0" err="1"/>
+              <a:t>awal</a:t>
+            </a:r>
+            <a:r>
+              <a:rPr lang="en-ID" dirty="0"/>
+              <a:t> v0 </a:t>
+            </a:r>
+            <a:r>
+              <a:rPr lang="en-ID" dirty="0" err="1"/>
+              <a:t>ke</a:t>
+            </a:r>
+            <a:r>
+              <a:rPr lang="en-ID" dirty="0"/>
+              <a:t> </a:t>
+            </a:r>
+            <a:r>
+              <a:rPr lang="en-ID" dirty="0" err="1"/>
+              <a:t>simpul</a:t>
+            </a:r>
+            <a:r>
+              <a:rPr lang="en-ID" dirty="0"/>
+              <a:t> </a:t>
+            </a:r>
+            <a:r>
+              <a:rPr lang="en-ID" dirty="0" err="1"/>
+              <a:t>tujuan</a:t>
+            </a:r>
+            <a:r>
+              <a:rPr lang="en-ID" dirty="0"/>
+              <a:t> </a:t>
+            </a:r>
+            <a:r>
+              <a:rPr lang="en-ID" dirty="0" err="1"/>
+              <a:t>vn</a:t>
+            </a:r>
+            <a:r>
+              <a:rPr lang="en-ID" dirty="0"/>
+              <a:t> di </a:t>
+            </a:r>
+            <a:r>
+              <a:rPr lang="en-ID" dirty="0" err="1"/>
+              <a:t>dalam</a:t>
+            </a:r>
+            <a:r>
+              <a:rPr lang="en-ID" dirty="0"/>
+              <a:t> </a:t>
+            </a:r>
+            <a:r>
+              <a:rPr lang="en-ID" dirty="0" err="1"/>
+              <a:t>graf</a:t>
+            </a:r>
+            <a:r>
+              <a:rPr lang="en-ID" dirty="0"/>
+              <a:t> G </a:t>
+            </a:r>
+            <a:r>
+              <a:rPr lang="en-ID" dirty="0" err="1"/>
+              <a:t>ialah</a:t>
+            </a:r>
+            <a:r>
+              <a:rPr lang="en-ID" dirty="0"/>
+              <a:t> </a:t>
+            </a:r>
+            <a:r>
+              <a:rPr lang="en-ID" dirty="0" err="1"/>
+              <a:t>barisan</a:t>
+            </a:r>
+            <a:r>
+              <a:rPr lang="en-ID" dirty="0"/>
+              <a:t> </a:t>
+            </a:r>
+            <a:r>
+              <a:rPr lang="en-ID" dirty="0" err="1"/>
+              <a:t>berselang-seling</a:t>
+            </a:r>
+            <a:r>
+              <a:rPr lang="en-ID" dirty="0"/>
+              <a:t> </a:t>
+            </a:r>
+            <a:r>
+              <a:rPr lang="en-ID" dirty="0" err="1"/>
+              <a:t>simpul-simpul</a:t>
+            </a:r>
+            <a:r>
+              <a:rPr lang="en-ID" dirty="0"/>
+              <a:t> dan </a:t>
+            </a:r>
+            <a:r>
+              <a:rPr lang="en-ID" dirty="0" err="1"/>
+              <a:t>sisi-sisi</a:t>
+            </a:r>
+            <a:r>
+              <a:rPr lang="en-ID" dirty="0"/>
+              <a:t> yang </a:t>
+            </a:r>
+            <a:r>
+              <a:rPr lang="en-ID" dirty="0" err="1"/>
+              <a:t>berbentuk</a:t>
+            </a:r>
+            <a:r>
+              <a:rPr lang="en-ID" dirty="0"/>
+              <a:t> v0, e1, v1, e2, v2,... , </a:t>
+            </a:r>
+            <a:r>
+              <a:rPr lang="en-ID" dirty="0" err="1"/>
+              <a:t>vn</a:t>
+            </a:r>
+            <a:r>
+              <a:rPr lang="en-ID" dirty="0"/>
+              <a:t> –1, </a:t>
+            </a:r>
+            <a:r>
+              <a:rPr lang="en-ID" dirty="0" err="1"/>
+              <a:t>en</a:t>
+            </a:r>
+            <a:r>
+              <a:rPr lang="en-ID" dirty="0"/>
+              <a:t>, </a:t>
+            </a:r>
+            <a:r>
+              <a:rPr lang="en-ID" dirty="0" err="1"/>
+              <a:t>vn</a:t>
+            </a:r>
+            <a:r>
+              <a:rPr lang="en-ID" dirty="0"/>
+              <a:t> </a:t>
+            </a:r>
+            <a:r>
+              <a:rPr lang="en-ID" dirty="0" err="1"/>
+              <a:t>sedemikian</a:t>
+            </a:r>
+            <a:r>
+              <a:rPr lang="en-ID" dirty="0"/>
+              <a:t> </a:t>
+            </a:r>
+            <a:r>
+              <a:rPr lang="en-ID" dirty="0" err="1"/>
+              <a:t>sehingga</a:t>
+            </a:r>
+            <a:r>
+              <a:rPr lang="en-ID" dirty="0"/>
+              <a:t> e1 = (v0, v1), e2 = (v1, v2), ... , </a:t>
+            </a:r>
+            <a:r>
+              <a:rPr lang="en-ID" dirty="0" err="1"/>
+              <a:t>en</a:t>
+            </a:r>
+            <a:r>
+              <a:rPr lang="en-ID" dirty="0"/>
+              <a:t> = (vn-1, </a:t>
+            </a:r>
+            <a:r>
+              <a:rPr lang="en-ID" dirty="0" err="1"/>
+              <a:t>vn</a:t>
+            </a:r>
+            <a:r>
+              <a:rPr lang="en-ID" dirty="0"/>
+              <a:t>) </a:t>
+            </a:r>
+            <a:r>
+              <a:rPr lang="en-ID" dirty="0" err="1"/>
+              <a:t>adalah</a:t>
+            </a:r>
+            <a:r>
+              <a:rPr lang="en-ID" dirty="0"/>
+              <a:t> </a:t>
+            </a:r>
+            <a:r>
+              <a:rPr lang="en-ID" dirty="0" err="1"/>
+              <a:t>sisi-sisi</a:t>
+            </a:r>
+            <a:r>
+              <a:rPr lang="en-ID" dirty="0"/>
+              <a:t> </a:t>
+            </a:r>
+            <a:r>
+              <a:rPr lang="en-ID" dirty="0" err="1"/>
+              <a:t>dari</a:t>
+            </a:r>
+            <a:r>
+              <a:rPr lang="en-ID" dirty="0"/>
+              <a:t> </a:t>
+            </a:r>
+            <a:r>
+              <a:rPr lang="en-ID" dirty="0" err="1"/>
+              <a:t>graf</a:t>
+            </a:r>
+            <a:r>
+              <a:rPr lang="en-ID" dirty="0"/>
+              <a:t> G.</a:t>
+            </a:r>
+          </a:p>
+          <a:p>
+            <a:pPr marL="0" indent="0">
+              <a:lnSpc>
+                <a:spcPct val="150000"/>
+              </a:lnSpc>
+              <a:buNone/>
+            </a:pPr>
+            <a:r>
+              <a:rPr lang="en-ID" dirty="0" err="1"/>
+              <a:t>Lintasan</a:t>
+            </a:r>
+            <a:r>
+              <a:rPr lang="en-ID" dirty="0"/>
+              <a:t> 1, 2, 4, 3 pada G1 </a:t>
+            </a:r>
+            <a:r>
+              <a:rPr lang="en-ID" dirty="0" err="1"/>
+              <a:t>adalah</a:t>
+            </a:r>
+            <a:r>
+              <a:rPr lang="en-ID" dirty="0"/>
+              <a:t> </a:t>
+            </a:r>
+            <a:r>
+              <a:rPr lang="en-ID" dirty="0" err="1"/>
+              <a:t>lintasan</a:t>
+            </a:r>
+            <a:r>
+              <a:rPr lang="en-ID" dirty="0"/>
+              <a:t> </a:t>
+            </a:r>
+            <a:r>
+              <a:rPr lang="en-ID" dirty="0" err="1"/>
+              <a:t>dengan</a:t>
+            </a:r>
+            <a:r>
+              <a:rPr lang="en-ID" dirty="0"/>
+              <a:t> </a:t>
+            </a:r>
+            <a:r>
+              <a:rPr lang="en-ID" dirty="0" err="1"/>
+              <a:t>barisan</a:t>
+            </a:r>
+            <a:r>
+              <a:rPr lang="en-ID" dirty="0"/>
+              <a:t> </a:t>
+            </a:r>
+            <a:r>
+              <a:rPr lang="en-ID" dirty="0" err="1"/>
+              <a:t>sisi</a:t>
+            </a:r>
+            <a:r>
+              <a:rPr lang="en-ID" dirty="0"/>
+              <a:t> (1,2), (2,4), (4,3). </a:t>
+            </a:r>
+          </a:p>
+          <a:p>
+            <a:pPr marL="0" indent="0">
+              <a:lnSpc>
+                <a:spcPct val="150000"/>
+              </a:lnSpc>
+              <a:buNone/>
+            </a:pPr>
+            <a:r>
+              <a:rPr lang="en-ID" dirty="0"/>
+              <a:t>Panjang </a:t>
+            </a:r>
+            <a:r>
+              <a:rPr lang="en-ID" dirty="0" err="1"/>
+              <a:t>lintasan</a:t>
+            </a:r>
+            <a:r>
+              <a:rPr lang="en-ID" dirty="0"/>
+              <a:t> </a:t>
+            </a:r>
+            <a:r>
+              <a:rPr lang="en-ID" dirty="0" err="1"/>
+              <a:t>adalah</a:t>
+            </a:r>
+            <a:r>
+              <a:rPr lang="en-ID" dirty="0"/>
+              <a:t> jumlah </a:t>
+            </a:r>
+            <a:r>
+              <a:rPr lang="en-ID" dirty="0" err="1"/>
+              <a:t>sisi</a:t>
+            </a:r>
+            <a:r>
+              <a:rPr lang="en-ID" dirty="0"/>
+              <a:t> </a:t>
+            </a:r>
+            <a:r>
+              <a:rPr lang="en-ID" dirty="0" err="1"/>
+              <a:t>dalam</a:t>
+            </a:r>
+            <a:r>
+              <a:rPr lang="en-ID" dirty="0"/>
+              <a:t> </a:t>
+            </a:r>
+            <a:r>
+              <a:rPr lang="en-ID" dirty="0" err="1"/>
+              <a:t>lintasan</a:t>
+            </a:r>
+            <a:r>
+              <a:rPr lang="en-ID" dirty="0"/>
+              <a:t> </a:t>
+            </a:r>
+            <a:r>
+              <a:rPr lang="en-ID" dirty="0" err="1"/>
+              <a:t>tersebut</a:t>
+            </a:r>
+            <a:r>
+              <a:rPr lang="en-ID" dirty="0"/>
+              <a:t>. </a:t>
+            </a:r>
+            <a:r>
+              <a:rPr lang="en-ID" dirty="0" err="1"/>
+              <a:t>Lintasan</a:t>
+            </a:r>
+            <a:r>
+              <a:rPr lang="en-ID" dirty="0"/>
+              <a:t> 1, 2, 4, 3 pada G1 </a:t>
+            </a:r>
+            <a:r>
+              <a:rPr lang="en-ID" dirty="0" err="1"/>
+              <a:t>memiliki</a:t>
+            </a:r>
+            <a:r>
+              <a:rPr lang="en-ID" dirty="0"/>
+              <a:t> </a:t>
+            </a:r>
+            <a:r>
+              <a:rPr lang="en-ID" dirty="0" err="1"/>
+              <a:t>panjang</a:t>
+            </a:r>
+            <a:r>
+              <a:rPr lang="en-ID" dirty="0"/>
+              <a:t> 3.</a:t>
+            </a:r>
+          </a:p>
+        </p:txBody>
+      </p:sp>
+      <p:pic>
+        <p:nvPicPr>
+          <p:cNvPr id="6" name="Picture 5">
+            <a:extLst>
+              <a:ext uri="{FF2B5EF4-FFF2-40B4-BE49-F238E27FC236}">
+                <a16:creationId xmlns:a16="http://schemas.microsoft.com/office/drawing/2014/main" id="{4B3607FD-3BD6-44F0-88CB-751CC57CB1A3}"/>
+              </a:ext>
+            </a:extLst>
+          </p:cNvPr>
+          <p:cNvPicPr>
+            <a:picLocks noChangeAspect="1"/>
+          </p:cNvPicPr>
+          <p:nvPr/>
+        </p:nvPicPr>
+        <p:blipFill>
+          <a:blip r:embed="rId2"/>
+          <a:stretch>
+            <a:fillRect/>
+          </a:stretch>
+        </p:blipFill>
+        <p:spPr>
+          <a:xfrm>
+            <a:off x="1097280" y="2108201"/>
+            <a:ext cx="2677421" cy="3760891"/>
+          </a:xfrm>
+          <a:prstGeom prst="rect">
+            <a:avLst/>
+          </a:prstGeom>
+        </p:spPr>
+      </p:pic>
+    </p:spTree>
+    <p:extLst>
+      <p:ext uri="{BB962C8B-B14F-4D97-AF65-F5344CB8AC3E}">
+        <p14:creationId xmlns:p14="http://schemas.microsoft.com/office/powerpoint/2010/main" val="1172588881"/>
+      </p:ext>
+    </p:extLst>
+  </p:cSld>
+  <p:clrMapOvr>
+    <a:masterClrMapping/>
+  </p:clrMapOvr>
+  <p:transition spd="slow">
+    <p:cover/>
+  </p:transition>
+</p:sld>
+</file>
+
+<file path=ppt/slides/slide11.xml><?xml version="1.0" encoding="utf-8"?>
+<p:sld xmlns:a="http://schemas.openxmlformats.org/drawingml/2006/main" xmlns:r="http://schemas.openxmlformats.org/officeDocument/2006/relationships" xmlns:p="http://schemas.openxmlformats.org/presentationml/2006/main">
+  <p:cSld>
+    <p:spTree>
+      <p:nvGrpSpPr>
+        <p:cNvPr id="1" name=""/>
+        <p:cNvGrpSpPr/>
+        <p:nvPr/>
+      </p:nvGrpSpPr>
+      <p:grpSpPr>
+        <a:xfrm>
+          <a:off x="0" y="0"/>
+          <a:ext cx="0" cy="0"/>
+          <a:chOff x="0" y="0"/>
+          <a:chExt cx="0" cy="0"/>
+        </a:xfrm>
+      </p:grpSpPr>
+      <p:sp>
+        <p:nvSpPr>
+          <p:cNvPr id="2" name="Title 1">
+            <a:extLst>
+              <a:ext uri="{FF2B5EF4-FFF2-40B4-BE49-F238E27FC236}">
+                <a16:creationId xmlns:a16="http://schemas.microsoft.com/office/drawing/2014/main" id="{006AA36F-4C07-4B21-A6AC-67332C6448EA}"/>
+              </a:ext>
+            </a:extLst>
+          </p:cNvPr>
+          <p:cNvSpPr>
+            <a:spLocks noGrp="1"/>
+          </p:cNvSpPr>
+          <p:nvPr>
+            <p:ph type="title"/>
+          </p:nvPr>
+        </p:nvSpPr>
+        <p:spPr>
+          <a:xfrm>
+            <a:off x="1097279" y="286603"/>
+            <a:ext cx="10942321" cy="1450757"/>
+          </a:xfrm>
+        </p:spPr>
+        <p:txBody>
+          <a:bodyPr/>
+          <a:lstStyle/>
+          <a:p>
+            <a:r>
+              <a:rPr lang="en-ID" dirty="0"/>
+              <a:t>7. </a:t>
+            </a:r>
+            <a:r>
+              <a:rPr lang="fr-FR" dirty="0" err="1"/>
+              <a:t>Siklus</a:t>
+            </a:r>
+            <a:r>
+              <a:rPr lang="fr-FR" dirty="0"/>
+              <a:t> (Cycle) </a:t>
+            </a:r>
+            <a:r>
+              <a:rPr lang="fr-FR" dirty="0" err="1"/>
+              <a:t>atau</a:t>
+            </a:r>
+            <a:r>
+              <a:rPr lang="fr-FR" dirty="0"/>
+              <a:t> </a:t>
+            </a:r>
+            <a:r>
+              <a:rPr lang="fr-FR" dirty="0" err="1"/>
+              <a:t>Sirkuit</a:t>
+            </a:r>
+            <a:r>
+              <a:rPr lang="fr-FR" dirty="0"/>
+              <a:t> (Circuit)</a:t>
+            </a:r>
+            <a:endParaRPr lang="en-ID" dirty="0"/>
+          </a:p>
+        </p:txBody>
+      </p:sp>
+      <p:sp>
+        <p:nvSpPr>
+          <p:cNvPr id="3" name="Content Placeholder 2">
+            <a:extLst>
+              <a:ext uri="{FF2B5EF4-FFF2-40B4-BE49-F238E27FC236}">
+                <a16:creationId xmlns:a16="http://schemas.microsoft.com/office/drawing/2014/main" id="{6ED8502D-F1EC-4778-A077-A34A0736E5F9}"/>
+              </a:ext>
+            </a:extLst>
+          </p:cNvPr>
+          <p:cNvSpPr>
+            <a:spLocks noGrp="1"/>
+          </p:cNvSpPr>
+          <p:nvPr>
+            <p:ph idx="1"/>
+          </p:nvPr>
+        </p:nvSpPr>
+        <p:spPr>
+          <a:xfrm>
+            <a:off x="4114800" y="2108201"/>
+            <a:ext cx="7040880" cy="3904672"/>
+          </a:xfrm>
+        </p:spPr>
+        <p:txBody>
+          <a:bodyPr>
+            <a:normAutofit/>
+          </a:bodyPr>
+          <a:lstStyle/>
+          <a:p>
+            <a:pPr marL="0" indent="0">
+              <a:lnSpc>
+                <a:spcPct val="150000"/>
+              </a:lnSpc>
+              <a:buNone/>
+            </a:pPr>
+            <a:r>
+              <a:rPr lang="en-ID" dirty="0" err="1"/>
+              <a:t>Lintasan</a:t>
+            </a:r>
+            <a:r>
+              <a:rPr lang="en-ID" dirty="0"/>
+              <a:t> yang </a:t>
+            </a:r>
+            <a:r>
+              <a:rPr lang="en-ID" dirty="0" err="1"/>
+              <a:t>berawal</a:t>
+            </a:r>
+            <a:r>
+              <a:rPr lang="en-ID" dirty="0"/>
+              <a:t> dan </a:t>
+            </a:r>
+            <a:r>
+              <a:rPr lang="en-ID" dirty="0" err="1"/>
+              <a:t>berakhir</a:t>
+            </a:r>
+            <a:r>
+              <a:rPr lang="en-ID" dirty="0"/>
+              <a:t> pada </a:t>
+            </a:r>
+            <a:r>
+              <a:rPr lang="en-ID" dirty="0" err="1"/>
+              <a:t>simpul</a:t>
+            </a:r>
+            <a:r>
+              <a:rPr lang="en-ID" dirty="0"/>
+              <a:t> yang </a:t>
+            </a:r>
+            <a:r>
+              <a:rPr lang="en-ID" dirty="0" err="1"/>
+              <a:t>sama</a:t>
+            </a:r>
+            <a:r>
+              <a:rPr lang="en-ID" dirty="0"/>
+              <a:t> </a:t>
+            </a:r>
+            <a:r>
+              <a:rPr lang="en-ID" dirty="0" err="1"/>
+              <a:t>disebut</a:t>
+            </a:r>
+            <a:r>
+              <a:rPr lang="en-ID" dirty="0"/>
+              <a:t> </a:t>
+            </a:r>
+            <a:r>
+              <a:rPr lang="en-ID" dirty="0" err="1"/>
+              <a:t>sirkuit</a:t>
+            </a:r>
+            <a:r>
+              <a:rPr lang="en-ID" dirty="0"/>
+              <a:t> </a:t>
+            </a:r>
+            <a:r>
+              <a:rPr lang="en-ID" dirty="0" err="1"/>
+              <a:t>atau</a:t>
+            </a:r>
+            <a:r>
+              <a:rPr lang="en-ID" dirty="0"/>
+              <a:t> </a:t>
+            </a:r>
+            <a:r>
+              <a:rPr lang="en-ID" dirty="0" err="1"/>
+              <a:t>siklus</a:t>
+            </a:r>
+            <a:r>
+              <a:rPr lang="en-ID" dirty="0"/>
+              <a:t>. </a:t>
+            </a:r>
+          </a:p>
+          <a:p>
+            <a:pPr marL="0" indent="0">
+              <a:lnSpc>
+                <a:spcPct val="150000"/>
+              </a:lnSpc>
+              <a:buNone/>
+            </a:pPr>
+            <a:r>
+              <a:rPr lang="en-ID" dirty="0"/>
+              <a:t>Pada </a:t>
+            </a:r>
+            <a:r>
+              <a:rPr lang="en-ID" dirty="0" err="1"/>
+              <a:t>graf</a:t>
+            </a:r>
+            <a:r>
+              <a:rPr lang="en-ID" dirty="0"/>
+              <a:t> G1 : </a:t>
+            </a:r>
+            <a:br>
+              <a:rPr lang="en-ID" dirty="0"/>
+            </a:br>
+            <a:r>
+              <a:rPr lang="en-ID" dirty="0" err="1"/>
+              <a:t>Lintasan</a:t>
+            </a:r>
+            <a:r>
+              <a:rPr lang="en-ID" dirty="0"/>
+              <a:t> 1, 2, 3, 1 </a:t>
+            </a:r>
+            <a:r>
+              <a:rPr lang="en-ID" dirty="0" err="1"/>
+              <a:t>adalah</a:t>
+            </a:r>
+            <a:r>
+              <a:rPr lang="en-ID" dirty="0"/>
+              <a:t> </a:t>
+            </a:r>
+            <a:r>
+              <a:rPr lang="en-ID" dirty="0" err="1"/>
+              <a:t>sebuah</a:t>
+            </a:r>
+            <a:r>
+              <a:rPr lang="en-ID" dirty="0"/>
+              <a:t> </a:t>
+            </a:r>
+            <a:r>
+              <a:rPr lang="en-ID" dirty="0" err="1"/>
+              <a:t>sirkuit</a:t>
+            </a:r>
+            <a:r>
+              <a:rPr lang="en-ID" dirty="0"/>
+              <a:t>. </a:t>
+            </a:r>
+          </a:p>
+          <a:p>
+            <a:pPr marL="0" indent="0">
+              <a:lnSpc>
+                <a:spcPct val="150000"/>
+              </a:lnSpc>
+              <a:buNone/>
+            </a:pPr>
+            <a:r>
+              <a:rPr lang="en-ID" dirty="0"/>
+              <a:t>Panjang </a:t>
+            </a:r>
+            <a:r>
+              <a:rPr lang="en-ID" dirty="0" err="1"/>
+              <a:t>sirkuit</a:t>
+            </a:r>
+            <a:r>
+              <a:rPr lang="en-ID" dirty="0"/>
+              <a:t> </a:t>
+            </a:r>
+            <a:r>
+              <a:rPr lang="en-ID" dirty="0" err="1"/>
+              <a:t>adalah</a:t>
+            </a:r>
+            <a:r>
+              <a:rPr lang="en-ID" dirty="0"/>
+              <a:t> jumlah </a:t>
+            </a:r>
+            <a:r>
+              <a:rPr lang="en-ID" dirty="0" err="1"/>
+              <a:t>sisi</a:t>
+            </a:r>
+            <a:r>
+              <a:rPr lang="en-ID" dirty="0"/>
+              <a:t> </a:t>
+            </a:r>
+            <a:r>
+              <a:rPr lang="en-ID" dirty="0" err="1"/>
+              <a:t>dalam</a:t>
+            </a:r>
+            <a:r>
+              <a:rPr lang="en-ID" dirty="0"/>
+              <a:t> </a:t>
+            </a:r>
+            <a:r>
+              <a:rPr lang="en-ID" dirty="0" err="1"/>
+              <a:t>sirkuit</a:t>
+            </a:r>
+            <a:r>
+              <a:rPr lang="en-ID" dirty="0"/>
+              <a:t> </a:t>
+            </a:r>
+            <a:r>
+              <a:rPr lang="en-ID" dirty="0" err="1"/>
+              <a:t>tersebut</a:t>
+            </a:r>
+            <a:r>
+              <a:rPr lang="en-ID" dirty="0"/>
+              <a:t>. </a:t>
+            </a:r>
+            <a:br>
+              <a:rPr lang="en-ID" dirty="0"/>
+            </a:br>
+            <a:r>
+              <a:rPr lang="en-ID" dirty="0" err="1"/>
+              <a:t>Sirkuit</a:t>
+            </a:r>
+            <a:r>
+              <a:rPr lang="en-ID" dirty="0"/>
+              <a:t> 1, 2, 3, 1 pada G1 </a:t>
+            </a:r>
+            <a:r>
+              <a:rPr lang="en-ID" dirty="0" err="1"/>
+              <a:t>memiliki</a:t>
+            </a:r>
+            <a:r>
+              <a:rPr lang="en-ID" dirty="0"/>
+              <a:t> </a:t>
+            </a:r>
+            <a:r>
+              <a:rPr lang="en-ID" dirty="0" err="1"/>
+              <a:t>panjang</a:t>
+            </a:r>
+            <a:r>
+              <a:rPr lang="en-ID" dirty="0"/>
+              <a:t> 3.</a:t>
+            </a:r>
+          </a:p>
+        </p:txBody>
+      </p:sp>
+      <p:pic>
+        <p:nvPicPr>
+          <p:cNvPr id="6" name="Picture 5">
+            <a:extLst>
+              <a:ext uri="{FF2B5EF4-FFF2-40B4-BE49-F238E27FC236}">
+                <a16:creationId xmlns:a16="http://schemas.microsoft.com/office/drawing/2014/main" id="{4B3607FD-3BD6-44F0-88CB-751CC57CB1A3}"/>
+              </a:ext>
+            </a:extLst>
+          </p:cNvPr>
+          <p:cNvPicPr>
+            <a:picLocks noChangeAspect="1"/>
+          </p:cNvPicPr>
+          <p:nvPr/>
+        </p:nvPicPr>
+        <p:blipFill>
+          <a:blip r:embed="rId2"/>
+          <a:stretch>
+            <a:fillRect/>
+          </a:stretch>
+        </p:blipFill>
+        <p:spPr>
+          <a:xfrm>
+            <a:off x="1097280" y="2108201"/>
+            <a:ext cx="2677421" cy="3760891"/>
+          </a:xfrm>
+          <a:prstGeom prst="rect">
+            <a:avLst/>
+          </a:prstGeom>
+        </p:spPr>
+      </p:pic>
+    </p:spTree>
+    <p:extLst>
+      <p:ext uri="{BB962C8B-B14F-4D97-AF65-F5344CB8AC3E}">
+        <p14:creationId xmlns:p14="http://schemas.microsoft.com/office/powerpoint/2010/main" val="2016702188"/>
+      </p:ext>
+    </p:extLst>
+  </p:cSld>
+  <p:clrMapOvr>
+    <a:masterClrMapping/>
+  </p:clrMapOvr>
+  <p:transition spd="slow">
+    <p:cover/>
+  </p:transition>
+</p:sld>
+</file>
+
+<file path=ppt/slides/slide12.xml><?xml version="1.0" encoding="utf-8"?>
+<p:sld xmlns:a="http://schemas.openxmlformats.org/drawingml/2006/main" xmlns:r="http://schemas.openxmlformats.org/officeDocument/2006/relationships" xmlns:p="http://schemas.openxmlformats.org/presentationml/2006/main">
+  <p:cSld>
+    <p:spTree>
+      <p:nvGrpSpPr>
+        <p:cNvPr id="1" name=""/>
+        <p:cNvGrpSpPr/>
+        <p:nvPr/>
+      </p:nvGrpSpPr>
+      <p:grpSpPr>
+        <a:xfrm>
+          <a:off x="0" y="0"/>
+          <a:ext cx="0" cy="0"/>
+          <a:chOff x="0" y="0"/>
+          <a:chExt cx="0" cy="0"/>
+        </a:xfrm>
+      </p:grpSpPr>
+      <p:sp>
+        <p:nvSpPr>
+          <p:cNvPr id="2" name="Title 1">
+            <a:extLst>
+              <a:ext uri="{FF2B5EF4-FFF2-40B4-BE49-F238E27FC236}">
+                <a16:creationId xmlns:a16="http://schemas.microsoft.com/office/drawing/2014/main" id="{006AA36F-4C07-4B21-A6AC-67332C6448EA}"/>
+              </a:ext>
+            </a:extLst>
+          </p:cNvPr>
+          <p:cNvSpPr>
+            <a:spLocks noGrp="1"/>
+          </p:cNvSpPr>
+          <p:nvPr>
+            <p:ph type="title"/>
+          </p:nvPr>
+        </p:nvSpPr>
+        <p:spPr>
+          <a:xfrm>
+            <a:off x="1097279" y="286603"/>
+            <a:ext cx="10058401" cy="1450757"/>
+          </a:xfrm>
+        </p:spPr>
+        <p:txBody>
+          <a:bodyPr/>
+          <a:lstStyle/>
+          <a:p>
+            <a:r>
+              <a:rPr lang="en-ID" dirty="0"/>
               <a:t>8. </a:t>
             </a:r>
             <a:r>
@@ -4292,7 +5215,7 @@
           <a:graphicData uri="http://schemas.openxmlformats.org/presentationml/2006/ole">
             <mc:AlternateContent xmlns:mc="http://schemas.openxmlformats.org/markup-compatibility/2006">
               <mc:Choice xmlns:v="urn:schemas-microsoft-com:vml" Requires="v">
-                <p:oleObj spid="_x0000_s1056" name="Image" r:id="rId3" imgW="914400" imgH="975240" progId="Photoshop.Image.22">
+                <p:oleObj spid="_x0000_s1080" name="Image" r:id="rId3" imgW="914400" imgH="975240" progId="Photoshop.Image.22">
                   <p:embed/>
                 </p:oleObj>
               </mc:Choice>
@@ -4361,7 +5284,7 @@
           <a:graphicData uri="http://schemas.openxmlformats.org/presentationml/2006/ole">
             <mc:AlternateContent xmlns:mc="http://schemas.openxmlformats.org/markup-compatibility/2006">
               <mc:Choice xmlns:v="urn:schemas-microsoft-com:vml" Requires="v">
-                <p:oleObj spid="_x0000_s1057" name="Image" r:id="rId5" imgW="597240" imgH="688680" progId="Photoshop.Image.22">
+                <p:oleObj spid="_x0000_s1081" name="Image" r:id="rId5" imgW="597240" imgH="688680" progId="Photoshop.Image.22">
                   <p:embed/>
                 </p:oleObj>
               </mc:Choice>
@@ -4412,7 +5335,7 @@
 </p:sld>
 </file>
 
-<file path=ppt/slides/slide11.xml><?xml version="1.0" encoding="utf-8"?>
+<file path=ppt/slides/slide13.xml><?xml version="1.0" encoding="utf-8"?>
 <p:sld xmlns:a="http://schemas.openxmlformats.org/drawingml/2006/main" xmlns:r="http://schemas.openxmlformats.org/officeDocument/2006/relationships" xmlns:p="http://schemas.openxmlformats.org/presentationml/2006/main">
   <p:cSld>
     <p:spTree>
@@ -4632,7 +5555,7 @@
 </p:sld>
 </file>
 
-<file path=ppt/slides/slide12.xml><?xml version="1.0" encoding="utf-8"?>
+<file path=ppt/slides/slide14.xml><?xml version="1.0" encoding="utf-8"?>
 <p:sld xmlns:a="http://schemas.openxmlformats.org/drawingml/2006/main" xmlns:r="http://schemas.openxmlformats.org/officeDocument/2006/relationships" xmlns:p="http://schemas.openxmlformats.org/presentationml/2006/main">
   <p:cSld>
     <p:spTree>
@@ -6702,6 +7625,14 @@
               <a:rPr lang="en-ID" dirty="0"/>
               <a:t>. </a:t>
             </a:r>
+          </a:p>
+          <a:p>
+            <a:pPr marL="0" indent="0">
+              <a:lnSpc>
+                <a:spcPct val="150000"/>
+              </a:lnSpc>
+              <a:buNone/>
+            </a:pPr>
             <a:r>
               <a:rPr lang="en-ID" dirty="0" err="1"/>
               <a:t>Notasi</a:t>
@@ -6847,15 +7778,15 @@
           <a:p>
             <a:r>
               <a:rPr lang="en-ID" dirty="0"/>
-              <a:t>6. </a:t>
-            </a:r>
-            <a:r>
-              <a:rPr lang="en-ID" dirty="0" err="1"/>
-              <a:t>Lintasan</a:t>
-            </a:r>
-            <a:r>
-              <a:rPr lang="en-ID" dirty="0"/>
-              <a:t> (Path)</a:t>
+              <a:t>5. </a:t>
+            </a:r>
+            <a:r>
+              <a:rPr lang="en-ID" dirty="0" err="1"/>
+              <a:t>Derajat</a:t>
+            </a:r>
+            <a:r>
+              <a:rPr lang="en-ID" dirty="0"/>
+              <a:t> (Degree)</a:t>
             </a:r>
           </a:p>
         </p:txBody>
@@ -6878,13 +7809,13 @@
         </p:nvSpPr>
         <p:spPr>
           <a:xfrm>
-            <a:off x="4114800" y="1868748"/>
-            <a:ext cx="7040880" cy="4322926"/>
+            <a:off x="4114800" y="2108201"/>
+            <a:ext cx="7040880" cy="3904672"/>
           </a:xfrm>
         </p:spPr>
         <p:txBody>
           <a:bodyPr>
-            <a:noAutofit/>
+            <a:normAutofit/>
           </a:bodyPr>
           <a:lstStyle/>
           <a:p>
@@ -6895,84 +7826,8 @@
               <a:buNone/>
             </a:pPr>
             <a:r>
-              <a:rPr lang="en-ID" dirty="0" err="1"/>
-              <a:t>Lintasan</a:t>
-            </a:r>
-            <a:r>
-              <a:rPr lang="en-ID" dirty="0"/>
-              <a:t> yang </a:t>
-            </a:r>
-            <a:r>
-              <a:rPr lang="en-ID" dirty="0" err="1"/>
-              <a:t>panjangnya</a:t>
-            </a:r>
-            <a:r>
-              <a:rPr lang="en-ID" dirty="0"/>
-              <a:t> n </a:t>
-            </a:r>
-            <a:r>
-              <a:rPr lang="en-ID" dirty="0" err="1"/>
-              <a:t>dari</a:t>
-            </a:r>
-            <a:r>
-              <a:rPr lang="en-ID" dirty="0"/>
-              <a:t> </a:t>
-            </a:r>
-            <a:r>
-              <a:rPr lang="en-ID" dirty="0" err="1"/>
-              <a:t>simpul</a:t>
-            </a:r>
-            <a:r>
-              <a:rPr lang="en-ID" dirty="0"/>
-              <a:t> </a:t>
-            </a:r>
-            <a:r>
-              <a:rPr lang="en-ID" dirty="0" err="1"/>
-              <a:t>awal</a:t>
-            </a:r>
-            <a:r>
-              <a:rPr lang="en-ID" dirty="0"/>
-              <a:t> v0 </a:t>
-            </a:r>
-            <a:r>
-              <a:rPr lang="en-ID" dirty="0" err="1"/>
-              <a:t>ke</a:t>
-            </a:r>
-            <a:r>
-              <a:rPr lang="en-ID" dirty="0"/>
-              <a:t> </a:t>
-            </a:r>
-            <a:r>
-              <a:rPr lang="en-ID" dirty="0" err="1"/>
-              <a:t>simpul</a:t>
-            </a:r>
-            <a:r>
-              <a:rPr lang="en-ID" dirty="0"/>
-              <a:t> </a:t>
-            </a:r>
-            <a:r>
-              <a:rPr lang="en-ID" dirty="0" err="1"/>
-              <a:t>tujuan</a:t>
-            </a:r>
-            <a:r>
-              <a:rPr lang="en-ID" dirty="0"/>
-              <a:t> </a:t>
-            </a:r>
-            <a:r>
-              <a:rPr lang="en-ID" dirty="0" err="1"/>
-              <a:t>vn</a:t>
-            </a:r>
-            <a:r>
-              <a:rPr lang="en-ID" dirty="0"/>
-              <a:t> di </a:t>
-            </a:r>
-            <a:r>
-              <a:rPr lang="en-ID" dirty="0" err="1"/>
-              <a:t>dalam</a:t>
-            </a:r>
-            <a:r>
-              <a:rPr lang="en-ID" dirty="0"/>
-              <a:t> </a:t>
+              <a:rPr lang="en-ID" dirty="0"/>
+              <a:t>Pada </a:t>
             </a:r>
             <a:r>
               <a:rPr lang="en-ID" dirty="0" err="1"/>
@@ -6980,293 +7835,64 @@
             </a:r>
             <a:r>
               <a:rPr lang="en-ID" dirty="0"/>
-              <a:t> G </a:t>
-            </a:r>
-            <a:r>
-              <a:rPr lang="en-ID" dirty="0" err="1"/>
-              <a:t>ialah</a:t>
-            </a:r>
-            <a:r>
-              <a:rPr lang="en-ID" dirty="0"/>
-              <a:t> </a:t>
-            </a:r>
-            <a:r>
-              <a:rPr lang="en-ID" dirty="0" err="1"/>
-              <a:t>barisan</a:t>
-            </a:r>
-            <a:r>
-              <a:rPr lang="en-ID" dirty="0"/>
-              <a:t> </a:t>
-            </a:r>
-            <a:r>
-              <a:rPr lang="en-ID" dirty="0" err="1"/>
-              <a:t>berselang-seling</a:t>
-            </a:r>
-            <a:r>
-              <a:rPr lang="en-ID" dirty="0"/>
-              <a:t> </a:t>
-            </a:r>
-            <a:r>
-              <a:rPr lang="en-ID" dirty="0" err="1"/>
-              <a:t>simpul-simpul</a:t>
-            </a:r>
-            <a:r>
-              <a:rPr lang="en-ID" dirty="0"/>
-              <a:t> dan </a:t>
-            </a:r>
-            <a:r>
-              <a:rPr lang="en-ID" dirty="0" err="1"/>
-              <a:t>sisi-sisi</a:t>
-            </a:r>
-            <a:r>
-              <a:rPr lang="en-ID" dirty="0"/>
-              <a:t> yang </a:t>
-            </a:r>
-            <a:r>
-              <a:rPr lang="en-ID" dirty="0" err="1"/>
-              <a:t>berbentuk</a:t>
-            </a:r>
-            <a:r>
-              <a:rPr lang="en-ID" dirty="0"/>
-              <a:t> v0, e1, v1, e2, v2,... , </a:t>
-            </a:r>
-            <a:r>
-              <a:rPr lang="en-ID" dirty="0" err="1"/>
-              <a:t>vn</a:t>
-            </a:r>
-            <a:r>
-              <a:rPr lang="en-ID" dirty="0"/>
-              <a:t> –1, </a:t>
-            </a:r>
-            <a:r>
-              <a:rPr lang="en-ID" dirty="0" err="1"/>
-              <a:t>en</a:t>
-            </a:r>
-            <a:r>
-              <a:rPr lang="en-ID" dirty="0"/>
-              <a:t>, </a:t>
-            </a:r>
-            <a:r>
-              <a:rPr lang="en-ID" dirty="0" err="1"/>
-              <a:t>vn</a:t>
-            </a:r>
-            <a:r>
-              <a:rPr lang="en-ID" dirty="0"/>
-              <a:t> </a:t>
-            </a:r>
-            <a:r>
-              <a:rPr lang="en-ID" dirty="0" err="1"/>
-              <a:t>sedemikian</a:t>
-            </a:r>
-            <a:r>
-              <a:rPr lang="en-ID" dirty="0"/>
-              <a:t> </a:t>
-            </a:r>
-            <a:r>
-              <a:rPr lang="en-ID" dirty="0" err="1"/>
-              <a:t>sehingga</a:t>
-            </a:r>
-            <a:r>
-              <a:rPr lang="en-ID" dirty="0"/>
-              <a:t> e1 = (v0, v1), e2 = (v1, v2), ... , </a:t>
-            </a:r>
-            <a:r>
-              <a:rPr lang="en-ID" dirty="0" err="1"/>
-              <a:t>en</a:t>
-            </a:r>
-            <a:r>
-              <a:rPr lang="en-ID" dirty="0"/>
-              <a:t> = (vn-1, </a:t>
-            </a:r>
-            <a:r>
-              <a:rPr lang="en-ID" dirty="0" err="1"/>
-              <a:t>vn</a:t>
-            </a:r>
-            <a:r>
-              <a:rPr lang="en-ID" dirty="0"/>
-              <a:t>) </a:t>
-            </a:r>
-            <a:r>
-              <a:rPr lang="en-ID" dirty="0" err="1"/>
-              <a:t>adalah</a:t>
-            </a:r>
-            <a:r>
-              <a:rPr lang="en-ID" dirty="0"/>
-              <a:t> </a:t>
-            </a:r>
-            <a:r>
-              <a:rPr lang="en-ID" dirty="0" err="1"/>
-              <a:t>sisi-sisi</a:t>
-            </a:r>
-            <a:r>
-              <a:rPr lang="en-ID" dirty="0"/>
-              <a:t> </a:t>
-            </a:r>
-            <a:r>
-              <a:rPr lang="en-ID" dirty="0" err="1"/>
-              <a:t>dari</a:t>
-            </a:r>
-            <a:r>
-              <a:rPr lang="en-ID" dirty="0"/>
-              <a:t> </a:t>
-            </a:r>
-            <a:r>
-              <a:rPr lang="en-ID" dirty="0" err="1"/>
-              <a:t>graf</a:t>
-            </a:r>
-            <a:r>
-              <a:rPr lang="en-ID" dirty="0"/>
-              <a:t> G.</a:t>
-            </a:r>
-          </a:p>
-          <a:p>
-            <a:pPr marL="0" indent="0">
+              <a:t> G3: </a:t>
+            </a:r>
+          </a:p>
+          <a:p>
+            <a:pPr marL="179388" indent="-179388">
               <a:lnSpc>
                 <a:spcPct val="150000"/>
               </a:lnSpc>
-              <a:buNone/>
+              <a:buFont typeface="Arial" panose="020B0604020202020204" pitchFamily="34" charset="0"/>
+              <a:buChar char="•"/>
             </a:pPr>
             <a:r>
-              <a:rPr lang="en-ID" dirty="0" err="1"/>
-              <a:t>Lintasan</a:t>
-            </a:r>
-            <a:r>
-              <a:rPr lang="en-ID" dirty="0"/>
-              <a:t> 1, 2, 4, 3 pada G1 </a:t>
-            </a:r>
-            <a:r>
-              <a:rPr lang="en-ID" dirty="0" err="1"/>
-              <a:t>adalah</a:t>
-            </a:r>
-            <a:r>
-              <a:rPr lang="en-ID" dirty="0"/>
-              <a:t> </a:t>
-            </a:r>
-            <a:r>
-              <a:rPr lang="en-ID" dirty="0" err="1"/>
-              <a:t>lintasan</a:t>
-            </a:r>
-            <a:r>
-              <a:rPr lang="en-ID" dirty="0"/>
-              <a:t> </a:t>
-            </a:r>
-            <a:r>
-              <a:rPr lang="en-ID" dirty="0" err="1"/>
-              <a:t>dengan</a:t>
-            </a:r>
-            <a:r>
-              <a:rPr lang="en-ID" dirty="0"/>
-              <a:t> </a:t>
-            </a:r>
-            <a:r>
-              <a:rPr lang="en-ID" dirty="0" err="1"/>
-              <a:t>barisan</a:t>
-            </a:r>
-            <a:r>
-              <a:rPr lang="en-ID" dirty="0"/>
-              <a:t> </a:t>
-            </a:r>
-            <a:r>
-              <a:rPr lang="en-ID" dirty="0" err="1"/>
-              <a:t>sisi</a:t>
-            </a:r>
-            <a:r>
-              <a:rPr lang="en-ID" dirty="0"/>
-              <a:t> (1,2), (2,4), (4,3). </a:t>
-            </a:r>
-          </a:p>
-          <a:p>
-            <a:pPr marL="0" indent="0">
+              <a:rPr lang="en-ID" dirty="0"/>
+              <a:t>d(5) = 0 -&gt; </a:t>
+            </a:r>
+            <a:r>
+              <a:rPr lang="en-ID" dirty="0" err="1"/>
+              <a:t>Simpul</a:t>
+            </a:r>
+            <a:r>
+              <a:rPr lang="en-ID" dirty="0"/>
+              <a:t> </a:t>
+            </a:r>
+            <a:r>
+              <a:rPr lang="en-ID" dirty="0" err="1"/>
+              <a:t>terpencil</a:t>
+            </a:r>
+            <a:endParaRPr lang="en-ID" dirty="0"/>
+          </a:p>
+          <a:p>
+            <a:pPr marL="179388" indent="-179388">
               <a:lnSpc>
                 <a:spcPct val="150000"/>
               </a:lnSpc>
-              <a:buNone/>
+              <a:buFont typeface="Arial" panose="020B0604020202020204" pitchFamily="34" charset="0"/>
+              <a:buChar char="•"/>
             </a:pPr>
             <a:r>
               <a:rPr lang="en-ID" dirty="0"/>
-              <a:t>Panjang </a:t>
-            </a:r>
-            <a:r>
-              <a:rPr lang="en-ID" dirty="0" err="1"/>
-              <a:t>lintasan</a:t>
-            </a:r>
-            <a:r>
-              <a:rPr lang="en-ID" dirty="0"/>
-              <a:t> </a:t>
-            </a:r>
-            <a:r>
-              <a:rPr lang="en-ID" dirty="0" err="1"/>
-              <a:t>adalah</a:t>
-            </a:r>
-            <a:r>
-              <a:rPr lang="en-ID" dirty="0"/>
-              <a:t> jumlah </a:t>
-            </a:r>
-            <a:r>
-              <a:rPr lang="en-ID" dirty="0" err="1"/>
-              <a:t>sisi</a:t>
-            </a:r>
-            <a:r>
-              <a:rPr lang="en-ID" dirty="0"/>
-              <a:t> </a:t>
-            </a:r>
-            <a:r>
-              <a:rPr lang="en-ID" dirty="0" err="1"/>
-              <a:t>dalam</a:t>
-            </a:r>
-            <a:r>
-              <a:rPr lang="en-ID" dirty="0"/>
-              <a:t> </a:t>
-            </a:r>
-            <a:r>
-              <a:rPr lang="en-ID" dirty="0" err="1"/>
-              <a:t>lintasan</a:t>
-            </a:r>
-            <a:r>
-              <a:rPr lang="en-ID" dirty="0"/>
-              <a:t> </a:t>
-            </a:r>
-            <a:r>
-              <a:rPr lang="en-ID" dirty="0" err="1"/>
-              <a:t>tersebut</a:t>
-            </a:r>
-            <a:r>
-              <a:rPr lang="en-ID" dirty="0"/>
-              <a:t>. </a:t>
-            </a:r>
-            <a:r>
-              <a:rPr lang="en-ID" dirty="0" err="1"/>
-              <a:t>Lintasan</a:t>
-            </a:r>
-            <a:r>
-              <a:rPr lang="en-ID" dirty="0"/>
-              <a:t> 1, 2, 4, 3 pada G1 </a:t>
-            </a:r>
-            <a:r>
-              <a:rPr lang="en-ID" dirty="0" err="1"/>
-              <a:t>memiliki</a:t>
-            </a:r>
-            <a:r>
-              <a:rPr lang="en-ID" dirty="0"/>
-              <a:t> </a:t>
-            </a:r>
-            <a:r>
-              <a:rPr lang="en-ID" dirty="0" err="1"/>
-              <a:t>panjang</a:t>
-            </a:r>
-            <a:r>
-              <a:rPr lang="en-ID" dirty="0"/>
-              <a:t> 3.</a:t>
+              <a:t>d(4) = 1 -&gt; </a:t>
+            </a:r>
+            <a:r>
+              <a:rPr lang="en-ID" dirty="0" err="1"/>
+              <a:t>Simpul</a:t>
+            </a:r>
+            <a:r>
+              <a:rPr lang="en-ID" dirty="0"/>
+              <a:t> anting-anting (pendant vertex)</a:t>
             </a:r>
           </a:p>
         </p:txBody>
       </p:sp>
       <p:pic>
         <p:nvPicPr>
-          <p:cNvPr id="6" name="Picture 5">
+          <p:cNvPr id="5" name="Picture 4">
             <a:extLst>
               <a:ext uri="{FF2B5EF4-FFF2-40B4-BE49-F238E27FC236}">
-                <a16:creationId xmlns:a16="http://schemas.microsoft.com/office/drawing/2014/main" id="{4B3607FD-3BD6-44F0-88CB-751CC57CB1A3}"/>
+                <a16:creationId xmlns:a16="http://schemas.microsoft.com/office/drawing/2014/main" id="{2B787F4A-C548-4256-9DEC-BED4A6C8CEB8}"/>
               </a:ext>
             </a:extLst>
           </p:cNvPr>
@@ -7283,8 +7909,8 @@
         </p:blipFill>
         <p:spPr>
           <a:xfrm>
-            <a:off x="1097280" y="2108201"/>
-            <a:ext cx="2677421" cy="3760891"/>
+            <a:off x="1097279" y="2108201"/>
+            <a:ext cx="2657303" cy="3331313"/>
           </a:xfrm>
           <a:prstGeom prst="rect">
             <a:avLst/>
@@ -7294,16 +7920,25 @@
     </p:spTree>
     <p:extLst>
       <p:ext uri="{BB962C8B-B14F-4D97-AF65-F5344CB8AC3E}">
-        <p14:creationId xmlns:p14="http://schemas.microsoft.com/office/powerpoint/2010/main" val="1172588881"/>
+        <p14:creationId xmlns:p14="http://schemas.microsoft.com/office/powerpoint/2010/main" val="2432006157"/>
       </p:ext>
     </p:extLst>
   </p:cSld>
   <p:clrMapOvr>
     <a:masterClrMapping/>
   </p:clrMapOvr>
-  <p:transition spd="slow">
-    <p:cover/>
-  </p:transition>
+  <mc:AlternateContent xmlns:mc="http://schemas.openxmlformats.org/markup-compatibility/2006">
+    <mc:Choice xmlns:p159="http://schemas.microsoft.com/office/powerpoint/2015/09/main" Requires="p159">
+      <p:transition xmlns:p14="http://schemas.microsoft.com/office/powerpoint/2010/main" spd="slow" p14:dur="2000">
+        <p159:morph option="byObject"/>
+      </p:transition>
+    </mc:Choice>
+    <mc:Fallback>
+      <p:transition spd="slow">
+        <p:fade/>
+      </p:transition>
+    </mc:Fallback>
+  </mc:AlternateContent>
 </p:sld>
 </file>
 
@@ -7343,7 +7978,7 @@
         <p:spPr>
           <a:xfrm>
             <a:off x="1097279" y="286603"/>
-            <a:ext cx="10942321" cy="1450757"/>
+            <a:ext cx="10058401" cy="1450757"/>
           </a:xfrm>
         </p:spPr>
         <p:txBody>
@@ -7352,33 +7987,16 @@
           <a:p>
             <a:r>
               <a:rPr lang="en-ID" dirty="0"/>
-              <a:t>7. </a:t>
-            </a:r>
-            <a:r>
-              <a:rPr lang="fr-FR" dirty="0" err="1"/>
-              <a:t>Siklus</a:t>
-            </a:r>
-            <a:r>
-              <a:rPr lang="fr-FR" dirty="0"/>
-              <a:t> (Cycle) </a:t>
-            </a:r>
-            <a:r>
-              <a:rPr lang="fr-FR" dirty="0" err="1"/>
-              <a:t>atau</a:t>
-            </a:r>
-            <a:r>
-              <a:rPr lang="fr-FR" dirty="0"/>
-              <a:t> </a:t>
-            </a:r>
-            <a:r>
-              <a:rPr lang="fr-FR" dirty="0" err="1"/>
-              <a:t>Sirkuit</a:t>
-            </a:r>
-            <a:r>
-              <a:rPr lang="fr-FR" dirty="0"/>
-              <a:t> (Circuit)</a:t>
-            </a:r>
-            <a:endParaRPr lang="en-ID" dirty="0"/>
+              <a:t>5. </a:t>
+            </a:r>
+            <a:r>
+              <a:rPr lang="en-ID" dirty="0" err="1"/>
+              <a:t>Derajat</a:t>
+            </a:r>
+            <a:r>
+              <a:rPr lang="en-ID" dirty="0"/>
+              <a:t> (Degree)</a:t>
+            </a:r>
           </a:p>
         </p:txBody>
       </p:sp>
@@ -7417,219 +8035,36 @@
               <a:buNone/>
             </a:pPr>
             <a:r>
-              <a:rPr lang="en-ID" dirty="0" err="1"/>
-              <a:t>Lintasan</a:t>
-            </a:r>
-            <a:r>
-              <a:rPr lang="en-ID" dirty="0"/>
-              <a:t> yang </a:t>
-            </a:r>
-            <a:r>
-              <a:rPr lang="en-ID" dirty="0" err="1"/>
-              <a:t>berawal</a:t>
-            </a:r>
-            <a:r>
-              <a:rPr lang="en-ID" dirty="0"/>
-              <a:t> dan </a:t>
-            </a:r>
-            <a:r>
-              <a:rPr lang="en-ID" dirty="0" err="1"/>
-              <a:t>berakhir</a:t>
-            </a:r>
-            <a:r>
-              <a:rPr lang="en-ID" dirty="0"/>
-              <a:t> pada </a:t>
-            </a:r>
-            <a:r>
-              <a:rPr lang="en-ID" dirty="0" err="1"/>
-              <a:t>simpul</a:t>
-            </a:r>
-            <a:r>
-              <a:rPr lang="en-ID" dirty="0"/>
-              <a:t> yang </a:t>
-            </a:r>
-            <a:r>
-              <a:rPr lang="en-ID" dirty="0" err="1"/>
-              <a:t>sama</a:t>
-            </a:r>
-            <a:r>
-              <a:rPr lang="en-ID" dirty="0"/>
-              <a:t> </a:t>
-            </a:r>
-            <a:r>
-              <a:rPr lang="en-ID" dirty="0" err="1"/>
-              <a:t>disebut</a:t>
-            </a:r>
-            <a:r>
-              <a:rPr lang="en-ID" dirty="0"/>
-              <a:t> </a:t>
-            </a:r>
-            <a:r>
-              <a:rPr lang="en-ID" dirty="0" err="1"/>
-              <a:t>sirkuit</a:t>
-            </a:r>
-            <a:r>
-              <a:rPr lang="en-ID" dirty="0"/>
-              <a:t> </a:t>
-            </a:r>
-            <a:r>
-              <a:rPr lang="en-ID" dirty="0" err="1"/>
-              <a:t>atau</a:t>
-            </a:r>
-            <a:r>
-              <a:rPr lang="en-ID" dirty="0"/>
-              <a:t> </a:t>
-            </a:r>
-            <a:r>
-              <a:rPr lang="en-ID" dirty="0" err="1"/>
-              <a:t>siklus</a:t>
-            </a:r>
-            <a:r>
-              <a:rPr lang="en-ID" dirty="0"/>
-              <a:t>. </a:t>
-            </a:r>
-          </a:p>
-          <a:p>
-            <a:pPr marL="0" indent="0">
+              <a:rPr lang="nn-NO" dirty="0"/>
+              <a:t>Pada graf G2: </a:t>
+            </a:r>
+          </a:p>
+          <a:p>
+            <a:pPr marL="179388" indent="-179388">
               <a:lnSpc>
                 <a:spcPct val="150000"/>
               </a:lnSpc>
-              <a:buNone/>
+              <a:buFont typeface="Arial" panose="020B0604020202020204" pitchFamily="34" charset="0"/>
+              <a:buChar char="•"/>
             </a:pPr>
             <a:r>
-              <a:rPr lang="en-ID" dirty="0"/>
-              <a:t>Pada </a:t>
-            </a:r>
-            <a:r>
-              <a:rPr lang="en-ID" dirty="0" err="1"/>
-              <a:t>graf</a:t>
-            </a:r>
-            <a:r>
-              <a:rPr lang="en-ID" dirty="0"/>
-              <a:t> G1 : </a:t>
-            </a:r>
-            <a:br>
-              <a:rPr lang="en-ID" dirty="0"/>
-            </a:br>
-            <a:r>
-              <a:rPr lang="en-ID" dirty="0" err="1"/>
-              <a:t>Lintasan</a:t>
-            </a:r>
-            <a:r>
-              <a:rPr lang="en-ID" dirty="0"/>
-              <a:t> 1, 2, 3, 1 </a:t>
-            </a:r>
-            <a:r>
-              <a:rPr lang="en-ID" dirty="0" err="1"/>
-              <a:t>adalah</a:t>
-            </a:r>
-            <a:r>
-              <a:rPr lang="en-ID" dirty="0"/>
-              <a:t> </a:t>
-            </a:r>
-            <a:r>
-              <a:rPr lang="en-ID" dirty="0" err="1"/>
-              <a:t>sebuah</a:t>
-            </a:r>
-            <a:r>
-              <a:rPr lang="en-ID" dirty="0"/>
-              <a:t> </a:t>
-            </a:r>
-            <a:r>
-              <a:rPr lang="en-ID" dirty="0" err="1"/>
-              <a:t>sirkuit</a:t>
-            </a:r>
-            <a:r>
-              <a:rPr lang="en-ID" dirty="0"/>
-              <a:t>. </a:t>
-            </a:r>
-          </a:p>
-          <a:p>
-            <a:pPr marL="0" indent="0">
+              <a:rPr lang="nn-NO" dirty="0"/>
+              <a:t>d(1) = 3 -&gt; Bersisian dengan sisi ganda</a:t>
+            </a:r>
+          </a:p>
+          <a:p>
+            <a:pPr marL="179388" indent="-179388">
               <a:lnSpc>
                 <a:spcPct val="150000"/>
               </a:lnSpc>
-              <a:buNone/>
+              <a:buFont typeface="Arial" panose="020B0604020202020204" pitchFamily="34" charset="0"/>
+              <a:buChar char="•"/>
             </a:pPr>
             <a:r>
-              <a:rPr lang="en-ID" dirty="0"/>
-              <a:t>Panjang </a:t>
-            </a:r>
-            <a:r>
-              <a:rPr lang="en-ID" dirty="0" err="1"/>
-              <a:t>sirkuit</a:t>
-            </a:r>
-            <a:r>
-              <a:rPr lang="en-ID" dirty="0"/>
-              <a:t> </a:t>
-            </a:r>
-            <a:r>
-              <a:rPr lang="en-ID" dirty="0" err="1"/>
-              <a:t>adalah</a:t>
-            </a:r>
-            <a:r>
-              <a:rPr lang="en-ID" dirty="0"/>
-              <a:t> jumlah </a:t>
-            </a:r>
-            <a:r>
-              <a:rPr lang="en-ID" dirty="0" err="1"/>
-              <a:t>sisi</a:t>
-            </a:r>
-            <a:r>
-              <a:rPr lang="en-ID" dirty="0"/>
-              <a:t> </a:t>
-            </a:r>
-            <a:r>
-              <a:rPr lang="en-ID" dirty="0" err="1"/>
-              <a:t>dalam</a:t>
-            </a:r>
-            <a:r>
-              <a:rPr lang="en-ID" dirty="0"/>
-              <a:t> </a:t>
-            </a:r>
-            <a:r>
-              <a:rPr lang="en-ID" dirty="0" err="1"/>
-              <a:t>sirkuit</a:t>
-            </a:r>
-            <a:r>
-              <a:rPr lang="en-ID" dirty="0"/>
-              <a:t> </a:t>
-            </a:r>
-            <a:r>
-              <a:rPr lang="en-ID" dirty="0" err="1"/>
-              <a:t>tersebut</a:t>
-            </a:r>
-            <a:r>
-              <a:rPr lang="en-ID" dirty="0"/>
-              <a:t>. </a:t>
-            </a:r>
-            <a:br>
-              <a:rPr lang="en-ID" dirty="0"/>
-            </a:br>
-            <a:r>
-              <a:rPr lang="en-ID" dirty="0" err="1"/>
-              <a:t>Sirkuit</a:t>
-            </a:r>
-            <a:r>
-              <a:rPr lang="en-ID" dirty="0"/>
-              <a:t> 1, 2, 3, 1 pada G1 </a:t>
-            </a:r>
-            <a:r>
-              <a:rPr lang="en-ID" dirty="0" err="1"/>
-              <a:t>memiliki</a:t>
-            </a:r>
-            <a:r>
-              <a:rPr lang="en-ID" dirty="0"/>
-              <a:t> </a:t>
-            </a:r>
-            <a:r>
-              <a:rPr lang="en-ID" dirty="0" err="1"/>
-              <a:t>panjang</a:t>
-            </a:r>
-            <a:r>
-              <a:rPr lang="en-ID" dirty="0"/>
-              <a:t> 3.</a:t>
-            </a:r>
+              <a:rPr lang="nn-NO" dirty="0"/>
+              <a:t>d(3) = 4 -&gt; Bersisian dengan sisi gelang (loop)</a:t>
+            </a:r>
+            <a:endParaRPr lang="en-ID" dirty="0"/>
           </a:p>
         </p:txBody>
       </p:sp>
@@ -7638,7 +8073,7 @@
           <p:cNvPr id="6" name="Picture 5">
             <a:extLst>
               <a:ext uri="{FF2B5EF4-FFF2-40B4-BE49-F238E27FC236}">
-                <a16:creationId xmlns:a16="http://schemas.microsoft.com/office/drawing/2014/main" id="{4B3607FD-3BD6-44F0-88CB-751CC57CB1A3}"/>
+                <a16:creationId xmlns:a16="http://schemas.microsoft.com/office/drawing/2014/main" id="{B7C8092E-1FA4-41B3-ABA0-9A9F402AB1B0}"/>
               </a:ext>
             </a:extLst>
           </p:cNvPr>
@@ -7655,8 +8090,8 @@
         </p:blipFill>
         <p:spPr>
           <a:xfrm>
-            <a:off x="1097280" y="2108201"/>
-            <a:ext cx="2677421" cy="3760891"/>
+            <a:off x="1097279" y="2468420"/>
+            <a:ext cx="2911495" cy="2352963"/>
           </a:xfrm>
           <a:prstGeom prst="rect">
             <a:avLst/>
@@ -7666,16 +8101,25 @@
     </p:spTree>
     <p:extLst>
       <p:ext uri="{BB962C8B-B14F-4D97-AF65-F5344CB8AC3E}">
-        <p14:creationId xmlns:p14="http://schemas.microsoft.com/office/powerpoint/2010/main" val="2016702188"/>
+        <p14:creationId xmlns:p14="http://schemas.microsoft.com/office/powerpoint/2010/main" val="2988130036"/>
       </p:ext>
     </p:extLst>
   </p:cSld>
   <p:clrMapOvr>
     <a:masterClrMapping/>
   </p:clrMapOvr>
-  <p:transition spd="slow">
-    <p:cover/>
-  </p:transition>
+  <mc:AlternateContent xmlns:mc="http://schemas.openxmlformats.org/markup-compatibility/2006">
+    <mc:Choice xmlns:p159="http://schemas.microsoft.com/office/powerpoint/2015/09/main" Requires="p159">
+      <p:transition xmlns:p14="http://schemas.microsoft.com/office/powerpoint/2010/main" spd="slow" p14:dur="2000">
+        <p159:morph option="byObject"/>
+      </p:transition>
+    </mc:Choice>
+    <mc:Fallback>
+      <p:transition spd="slow">
+        <p:fade/>
+      </p:transition>
+    </mc:Fallback>
+  </mc:AlternateContent>
 </p:sld>
 </file>
 
@@ -8015,6 +8459,15 @@
 </file>
 
 <file path=customXml/item2.xml><?xml version="1.0" encoding="utf-8"?>
+<?mso-contentType ?>
+<FormTemplates xmlns="http://schemas.microsoft.com/sharepoint/v3/contenttype/forms">
+  <Display>DocumentLibraryForm</Display>
+  <Edit>DocumentLibraryForm</Edit>
+  <New>DocumentLibraryForm</New>
+</FormTemplates>
+</file>
+
+<file path=customXml/item3.xml><?xml version="1.0" encoding="utf-8"?>
 <ct:contentTypeSchema xmlns:ct="http://schemas.microsoft.com/office/2006/metadata/contentType" xmlns:ma="http://schemas.microsoft.com/office/2006/metadata/properties/metaAttributes" ct:_="" ma:_="" ma:contentTypeName="Document" ma:contentTypeID="0x01010079F111ED35F8CC479449609E8A0923A6" ma:contentTypeVersion="12" ma:contentTypeDescription="Create a new document." ma:contentTypeScope="" ma:versionID="a410dd7f93c95333ffa1b60ed6adedd1">
   <xsd:schema xmlns:xsd="http://www.w3.org/2001/XMLSchema" xmlns:xs="http://www.w3.org/2001/XMLSchema" xmlns:p="http://schemas.microsoft.com/office/2006/metadata/properties" xmlns:ns2="71af3243-3dd4-4a8d-8c0d-dd76da1f02a5" xmlns:ns3="16c05727-aa75-4e4a-9b5f-8a80a1165891" targetNamespace="http://schemas.microsoft.com/office/2006/metadata/properties" ma:root="true" ma:fieldsID="a936d9baba76aa3866493feff160faab" ns2:_="" ns3:_="">
     <xsd:import namespace="71af3243-3dd4-4a8d-8c0d-dd76da1f02a5"/>
@@ -8235,15 +8688,6 @@
 </ct:contentTypeSchema>
 </file>
 
-<file path=customXml/item3.xml><?xml version="1.0" encoding="utf-8"?>
-<?mso-contentType ?>
-<FormTemplates xmlns="http://schemas.microsoft.com/sharepoint/v3/contenttype/forms">
-  <Display>DocumentLibraryForm</Display>
-  <Edit>DocumentLibraryForm</Edit>
-  <New>DocumentLibraryForm</New>
-</FormTemplates>
-</file>
-
 <file path=customXml/itemProps1.xml><?xml version="1.0" encoding="utf-8"?>
 <ds:datastoreItem xmlns:ds="http://schemas.openxmlformats.org/officeDocument/2006/customXml" ds:itemID="{4F5B1FD9-3BB6-4DA9-A089-3B68C2323D4F}">
   <ds:schemaRefs>
@@ -8255,6 +8699,14 @@
 </file>
 
 <file path=customXml/itemProps2.xml><?xml version="1.0" encoding="utf-8"?>
+<ds:datastoreItem xmlns:ds="http://schemas.openxmlformats.org/officeDocument/2006/customXml" ds:itemID="{638A3B04-B0F3-4C12-A722-52B5CF6D9723}">
+  <ds:schemaRefs>
+    <ds:schemaRef ds:uri="http://schemas.microsoft.com/sharepoint/v3/contenttype/forms"/>
+  </ds:schemaRefs>
+</ds:datastoreItem>
+</file>
+
+<file path=customXml/itemProps3.xml><?xml version="1.0" encoding="utf-8"?>
 <ds:datastoreItem xmlns:ds="http://schemas.openxmlformats.org/officeDocument/2006/customXml" ds:itemID="{1747A963-53E0-44AF-AF13-963FE676C682}">
   <ds:schemaRefs>
     <ds:schemaRef ds:uri="http://schemas.microsoft.com/office/2006/metadata/contentType"/>
@@ -8271,12 +8723,4 @@
     <ds:schemaRef ds:uri="http://schemas.microsoft.com/internal/obd"/>
   </ds:schemaRefs>
 </ds:datastoreItem>
-</file>
-
-<file path=customXml/itemProps3.xml><?xml version="1.0" encoding="utf-8"?>
-<ds:datastoreItem xmlns:ds="http://schemas.openxmlformats.org/officeDocument/2006/customXml" ds:itemID="{638A3B04-B0F3-4C12-A722-52B5CF6D9723}">
-  <ds:schemaRefs>
-    <ds:schemaRef ds:uri="http://schemas.microsoft.com/sharepoint/v3/contenttype/forms"/>
-  </ds:schemaRefs>
-</ds:datastoreItem>
 </file>
</xml_diff>